<commit_message>
Vaa3D v3.14 / TeraFly version 2.1.5
- New: "Open unconverted image" feature 100% supported. A virtual
pyramid image is generated
       according to the user-selectable resampling factor (menu Options
> Import > Unconver-
       ted Image > Pyramid Resampling Factor).
       To see image data, one should zoom-in to the highest resolution.
       @TODO: already viewed data will be cached and back-propagated
throughout the pyramid
- New: GUI changes color (currently, to yellow) while waiting for image
data to be loaded
</commit_message>
<xml_diff>
--- a/v3d_main/terafly/icons/icons.pptx
+++ b/v3d_main/terafly/icons/icons.pptx
@@ -305,7 +305,7 @@
           <a:p>
             <a:fld id="{A3FFFC81-E8A9-43A5-BD7A-0818E158DC6F}" type="datetimeFigureOut">
               <a:rPr lang="en-US" smtClean="0"/>
-              <a:t>5/7/2015</a:t>
+              <a:t>3/10/2016</a:t>
             </a:fld>
             <a:endParaRPr lang="en-US"/>
           </a:p>
@@ -475,7 +475,7 @@
           <a:p>
             <a:fld id="{A3FFFC81-E8A9-43A5-BD7A-0818E158DC6F}" type="datetimeFigureOut">
               <a:rPr lang="en-US" smtClean="0"/>
-              <a:t>5/7/2015</a:t>
+              <a:t>3/10/2016</a:t>
             </a:fld>
             <a:endParaRPr lang="en-US"/>
           </a:p>
@@ -655,7 +655,7 @@
           <a:p>
             <a:fld id="{A3FFFC81-E8A9-43A5-BD7A-0818E158DC6F}" type="datetimeFigureOut">
               <a:rPr lang="en-US" smtClean="0"/>
-              <a:t>5/7/2015</a:t>
+              <a:t>3/10/2016</a:t>
             </a:fld>
             <a:endParaRPr lang="en-US"/>
           </a:p>
@@ -825,7 +825,7 @@
           <a:p>
             <a:fld id="{A3FFFC81-E8A9-43A5-BD7A-0818E158DC6F}" type="datetimeFigureOut">
               <a:rPr lang="en-US" smtClean="0"/>
-              <a:t>5/7/2015</a:t>
+              <a:t>3/10/2016</a:t>
             </a:fld>
             <a:endParaRPr lang="en-US"/>
           </a:p>
@@ -1071,7 +1071,7 @@
           <a:p>
             <a:fld id="{A3FFFC81-E8A9-43A5-BD7A-0818E158DC6F}" type="datetimeFigureOut">
               <a:rPr lang="en-US" smtClean="0"/>
-              <a:t>5/7/2015</a:t>
+              <a:t>3/10/2016</a:t>
             </a:fld>
             <a:endParaRPr lang="en-US"/>
           </a:p>
@@ -1359,7 +1359,7 @@
           <a:p>
             <a:fld id="{A3FFFC81-E8A9-43A5-BD7A-0818E158DC6F}" type="datetimeFigureOut">
               <a:rPr lang="en-US" smtClean="0"/>
-              <a:t>5/7/2015</a:t>
+              <a:t>3/10/2016</a:t>
             </a:fld>
             <a:endParaRPr lang="en-US"/>
           </a:p>
@@ -1781,7 +1781,7 @@
           <a:p>
             <a:fld id="{A3FFFC81-E8A9-43A5-BD7A-0818E158DC6F}" type="datetimeFigureOut">
               <a:rPr lang="en-US" smtClean="0"/>
-              <a:t>5/7/2015</a:t>
+              <a:t>3/10/2016</a:t>
             </a:fld>
             <a:endParaRPr lang="en-US"/>
           </a:p>
@@ -1899,7 +1899,7 @@
           <a:p>
             <a:fld id="{A3FFFC81-E8A9-43A5-BD7A-0818E158DC6F}" type="datetimeFigureOut">
               <a:rPr lang="en-US" smtClean="0"/>
-              <a:t>5/7/2015</a:t>
+              <a:t>3/10/2016</a:t>
             </a:fld>
             <a:endParaRPr lang="en-US"/>
           </a:p>
@@ -1994,7 +1994,7 @@
           <a:p>
             <a:fld id="{A3FFFC81-E8A9-43A5-BD7A-0818E158DC6F}" type="datetimeFigureOut">
               <a:rPr lang="en-US" smtClean="0"/>
-              <a:t>5/7/2015</a:t>
+              <a:t>3/10/2016</a:t>
             </a:fld>
             <a:endParaRPr lang="en-US"/>
           </a:p>
@@ -2271,7 +2271,7 @@
           <a:p>
             <a:fld id="{A3FFFC81-E8A9-43A5-BD7A-0818E158DC6F}" type="datetimeFigureOut">
               <a:rPr lang="en-US" smtClean="0"/>
-              <a:t>5/7/2015</a:t>
+              <a:t>3/10/2016</a:t>
             </a:fld>
             <a:endParaRPr lang="en-US"/>
           </a:p>
@@ -2524,7 +2524,7 @@
           <a:p>
             <a:fld id="{A3FFFC81-E8A9-43A5-BD7A-0818E158DC6F}" type="datetimeFigureOut">
               <a:rPr lang="en-US" smtClean="0"/>
-              <a:t>5/7/2015</a:t>
+              <a:t>3/10/2016</a:t>
             </a:fld>
             <a:endParaRPr lang="en-US"/>
           </a:p>
@@ -2737,7 +2737,7 @@
           <a:p>
             <a:fld id="{A3FFFC81-E8A9-43A5-BD7A-0818E158DC6F}" type="datetimeFigureOut">
               <a:rPr lang="en-US" smtClean="0"/>
-              <a:t>5/7/2015</a:t>
+              <a:t>3/10/2016</a:t>
             </a:fld>
             <a:endParaRPr lang="en-US"/>
           </a:p>
@@ -5050,6 +5050,269 @@
           </a:p>
         </p:txBody>
       </p:sp>
+      <p:pic>
+        <p:nvPicPr>
+          <p:cNvPr id="11" name="Immagine 10"/>
+          <p:cNvPicPr>
+            <a:picLocks noChangeAspect="1"/>
+          </p:cNvPicPr>
+          <p:nvPr/>
+        </p:nvPicPr>
+        <p:blipFill>
+          <a:blip r:embed="rId7" cstate="print">
+            <a:extLst>
+              <a:ext uri="{28A0092B-C50C-407E-A947-70E740481C1C}">
+                <a14:useLocalDpi xmlns:a14="http://schemas.microsoft.com/office/drawing/2010/main" val="0"/>
+              </a:ext>
+            </a:extLst>
+          </a:blip>
+          <a:stretch>
+            <a:fillRect/>
+          </a:stretch>
+        </p:blipFill>
+        <p:spPr>
+          <a:xfrm>
+            <a:off x="201848" y="4874412"/>
+            <a:ext cx="1298799" cy="1281643"/>
+          </a:xfrm>
+          <a:prstGeom prst="rect">
+            <a:avLst/>
+          </a:prstGeom>
+        </p:spPr>
+      </p:pic>
+      <p:grpSp>
+        <p:nvGrpSpPr>
+          <p:cNvPr id="44" name="Gruppo 43"/>
+          <p:cNvGrpSpPr/>
+          <p:nvPr/>
+        </p:nvGrpSpPr>
+        <p:grpSpPr>
+          <a:xfrm>
+            <a:off x="1943313" y="4942560"/>
+            <a:ext cx="1260000" cy="1260000"/>
+            <a:chOff x="1943313" y="4942560"/>
+            <a:chExt cx="1260000" cy="1260000"/>
+          </a:xfrm>
+        </p:grpSpPr>
+        <p:sp>
+          <p:nvSpPr>
+            <p:cNvPr id="60" name="Rettangolo 59"/>
+            <p:cNvSpPr/>
+            <p:nvPr/>
+          </p:nvSpPr>
+          <p:spPr>
+            <a:xfrm>
+              <a:off x="1943313" y="4942560"/>
+              <a:ext cx="1260000" cy="1260000"/>
+            </a:xfrm>
+            <a:prstGeom prst="rect">
+              <a:avLst/>
+            </a:prstGeom>
+            <a:noFill/>
+            <a:ln w="3175">
+              <a:noFill/>
+            </a:ln>
+          </p:spPr>
+          <p:style>
+            <a:lnRef idx="2">
+              <a:schemeClr val="accent1">
+                <a:shade val="50000"/>
+              </a:schemeClr>
+            </a:lnRef>
+            <a:fillRef idx="1">
+              <a:schemeClr val="accent1"/>
+            </a:fillRef>
+            <a:effectRef idx="0">
+              <a:schemeClr val="accent1"/>
+            </a:effectRef>
+            <a:fontRef idx="minor">
+              <a:schemeClr val="lt1"/>
+            </a:fontRef>
+          </p:style>
+          <p:txBody>
+            <a:bodyPr rtlCol="0" anchor="ctr"/>
+            <a:lstStyle/>
+            <a:p>
+              <a:pPr algn="ctr"/>
+              <a:endParaRPr lang="en-US">
+                <a:noFill/>
+              </a:endParaRPr>
+            </a:p>
+          </p:txBody>
+        </p:sp>
+        <p:pic>
+          <p:nvPicPr>
+            <p:cNvPr id="19" name="Immagine 18"/>
+            <p:cNvPicPr>
+              <a:picLocks noChangeAspect="1"/>
+            </p:cNvPicPr>
+            <p:nvPr/>
+          </p:nvPicPr>
+          <p:blipFill>
+            <a:blip r:embed="rId8" cstate="print">
+              <a:extLst>
+                <a:ext uri="{BEBA8EAE-BF5A-486C-A8C5-ECC9F3942E4B}">
+                  <a14:imgProps xmlns:a14="http://schemas.microsoft.com/office/drawing/2010/main">
+                    <a14:imgLayer r:embed="rId9">
+                      <a14:imgEffect>
+                        <a14:backgroundRemoval t="0" b="100000" l="0" r="100000">
+                          <a14:foregroundMark x1="33333" y1="43478" x2="33333" y2="43478"/>
+                          <a14:foregroundMark x1="33333" y1="30435" x2="33333" y2="30435"/>
+                          <a14:foregroundMark x1="34127" y1="14493" x2="34127" y2="14493"/>
+                          <a14:foregroundMark x1="35714" y1="8696" x2="35714" y2="8696"/>
+                          <a14:foregroundMark x1="84127" y1="10145" x2="84127" y2="10145"/>
+                        </a14:backgroundRemoval>
+                      </a14:imgEffect>
+                    </a14:imgLayer>
+                  </a14:imgProps>
+                </a:ext>
+                <a:ext uri="{28A0092B-C50C-407E-A947-70E740481C1C}">
+                  <a14:useLocalDpi xmlns:a14="http://schemas.microsoft.com/office/drawing/2010/main" val="0"/>
+                </a:ext>
+              </a:extLst>
+            </a:blip>
+            <a:stretch>
+              <a:fillRect/>
+            </a:stretch>
+          </p:blipFill>
+          <p:spPr>
+            <a:xfrm>
+              <a:off x="1959546" y="5271510"/>
+              <a:ext cx="1226895" cy="674793"/>
+            </a:xfrm>
+            <a:prstGeom prst="rect">
+              <a:avLst/>
+            </a:prstGeom>
+          </p:spPr>
+        </p:pic>
+      </p:grpSp>
+      <p:pic>
+        <p:nvPicPr>
+          <p:cNvPr id="28" name="Immagine 27"/>
+          <p:cNvPicPr>
+            <a:picLocks noChangeAspect="1"/>
+          </p:cNvPicPr>
+          <p:nvPr/>
+        </p:nvPicPr>
+        <p:blipFill>
+          <a:blip r:embed="rId10" cstate="print">
+            <a:duotone>
+              <a:schemeClr val="accent1">
+                <a:shade val="45000"/>
+                <a:satMod val="135000"/>
+              </a:schemeClr>
+              <a:prstClr val="white"/>
+            </a:duotone>
+            <a:extLst>
+              <a:ext uri="{28A0092B-C50C-407E-A947-70E740481C1C}">
+                <a14:useLocalDpi xmlns:a14="http://schemas.microsoft.com/office/drawing/2010/main" val="0"/>
+              </a:ext>
+            </a:extLst>
+          </a:blip>
+          <a:stretch>
+            <a:fillRect/>
+          </a:stretch>
+        </p:blipFill>
+        <p:spPr>
+          <a:xfrm>
+            <a:off x="2728221" y="1978513"/>
+            <a:ext cx="2079856" cy="2079856"/>
+          </a:xfrm>
+          <a:prstGeom prst="rect">
+            <a:avLst/>
+          </a:prstGeom>
+        </p:spPr>
+      </p:pic>
+      <p:pic>
+        <p:nvPicPr>
+          <p:cNvPr id="40" name="Immagine 39"/>
+          <p:cNvPicPr>
+            <a:picLocks noChangeAspect="1"/>
+          </p:cNvPicPr>
+          <p:nvPr/>
+        </p:nvPicPr>
+        <p:blipFill>
+          <a:blip r:embed="rId11" cstate="print">
+            <a:extLst>
+              <a:ext uri="{28A0092B-C50C-407E-A947-70E740481C1C}">
+                <a14:useLocalDpi xmlns:a14="http://schemas.microsoft.com/office/drawing/2010/main" val="0"/>
+              </a:ext>
+            </a:extLst>
+          </a:blip>
+          <a:stretch>
+            <a:fillRect/>
+          </a:stretch>
+        </p:blipFill>
+        <p:spPr>
+          <a:xfrm>
+            <a:off x="2950700" y="223340"/>
+            <a:ext cx="1025596" cy="1025596"/>
+          </a:xfrm>
+          <a:prstGeom prst="rect">
+            <a:avLst/>
+          </a:prstGeom>
+        </p:spPr>
+      </p:pic>
+      <p:pic>
+        <p:nvPicPr>
+          <p:cNvPr id="41" name="Immagine 40"/>
+          <p:cNvPicPr>
+            <a:picLocks noChangeAspect="1"/>
+          </p:cNvPicPr>
+          <p:nvPr/>
+        </p:nvPicPr>
+        <p:blipFill>
+          <a:blip r:embed="rId12">
+            <a:extLst>
+              <a:ext uri="{28A0092B-C50C-407E-A947-70E740481C1C}">
+                <a14:useLocalDpi xmlns:a14="http://schemas.microsoft.com/office/drawing/2010/main" val="0"/>
+              </a:ext>
+            </a:extLst>
+          </a:blip>
+          <a:stretch>
+            <a:fillRect/>
+          </a:stretch>
+        </p:blipFill>
+        <p:spPr>
+          <a:xfrm>
+            <a:off x="4282896" y="223340"/>
+            <a:ext cx="1235496" cy="1235496"/>
+          </a:xfrm>
+          <a:prstGeom prst="rect">
+            <a:avLst/>
+          </a:prstGeom>
+        </p:spPr>
+      </p:pic>
+      <p:pic>
+        <p:nvPicPr>
+          <p:cNvPr id="45" name="Immagine 44"/>
+          <p:cNvPicPr>
+            <a:picLocks noChangeAspect="1"/>
+          </p:cNvPicPr>
+          <p:nvPr/>
+        </p:nvPicPr>
+        <p:blipFill>
+          <a:blip r:embed="rId13">
+            <a:extLst>
+              <a:ext uri="{28A0092B-C50C-407E-A947-70E740481C1C}">
+                <a14:useLocalDpi xmlns:a14="http://schemas.microsoft.com/office/drawing/2010/main" val="0"/>
+              </a:ext>
+            </a:extLst>
+          </a:blip>
+          <a:stretch>
+            <a:fillRect/>
+          </a:stretch>
+        </p:blipFill>
+        <p:spPr>
+          <a:xfrm>
+            <a:off x="7741760" y="970052"/>
+            <a:ext cx="1219200" cy="1219200"/>
+          </a:xfrm>
+          <a:prstGeom prst="rect">
+            <a:avLst/>
+          </a:prstGeom>
+        </p:spPr>
+      </p:pic>
     </p:spTree>
     <p:extLst>
       <p:ext uri="{BB962C8B-B14F-4D97-AF65-F5344CB8AC3E}">

</xml_diff>